<commit_message>
Fix time break down plot for 128 nodes and notes from the meeting
</commit_message>
<xml_diff>
--- a/related_works/summary_slides/Project_Progress_Time_Breakdown_IO_20180629.pptx
+++ b/related_works/summary_slides/Project_Progress_Time_Breakdown_IO_20180629.pptx
@@ -3756,7 +3756,7 @@
           </c:val>
           <c:extLst>
             <c:ext xmlns:c16="http://schemas.microsoft.com/office/drawing/2014/chart" uri="{C3380CC4-5D6E-409C-BE32-E72D297353CC}">
-              <c16:uniqueId val="{00000000-88E8-F140-81EC-EC36AA0DD4AC}"/>
+              <c16:uniqueId val="{00000000-94D4-DE44-B62E-E0D20670E4A3}"/>
             </c:ext>
           </c:extLst>
         </c:ser>
@@ -3867,7 +3867,7 @@
           </c:val>
           <c:extLst>
             <c:ext xmlns:c16="http://schemas.microsoft.com/office/drawing/2014/chart" uri="{C3380CC4-5D6E-409C-BE32-E72D297353CC}">
-              <c16:uniqueId val="{00000001-88E8-F140-81EC-EC36AA0DD4AC}"/>
+              <c16:uniqueId val="{00000001-94D4-DE44-B62E-E0D20670E4A3}"/>
             </c:ext>
           </c:extLst>
         </c:ser>
@@ -3954,31 +3954,31 @@
           </c:dLbls>
           <c:val>
             <c:numRef>
-              <c:f>([2]calculation!$C$13,[2]calculation!$D$13,[2]calculation!$E$13,[2]calculation!$F$13,[2]calculation!$G$13)</c:f>
+              <c:f>(calculation!$C$13,calculation!$D$13,calculation!$E$13,calculation!$F$13,calculation!$G$13)</c:f>
               <c:numCache>
                 <c:formatCode>General</c:formatCode>
                 <c:ptCount val="5"/>
                 <c:pt idx="0">
-                  <c:v>554.86514921857849</c:v>
+                  <c:v>288.86313127167608</c:v>
                 </c:pt>
                 <c:pt idx="1">
-                  <c:v>507.31487143784557</c:v>
+                  <c:v>329.26621133834448</c:v>
                 </c:pt>
                 <c:pt idx="2">
-                  <c:v>503.16940387338866</c:v>
+                  <c:v>255.29899525269866</c:v>
                 </c:pt>
                 <c:pt idx="3">
-                  <c:v>512.25544729084038</c:v>
+                  <c:v>260.43904749117632</c:v>
                 </c:pt>
                 <c:pt idx="4">
-                  <c:v>456.45263212919502</c:v>
+                  <c:v>224.74579957500384</c:v>
                 </c:pt>
               </c:numCache>
             </c:numRef>
           </c:val>
           <c:extLst>
             <c:ext xmlns:c16="http://schemas.microsoft.com/office/drawing/2014/chart" uri="{C3380CC4-5D6E-409C-BE32-E72D297353CC}">
-              <c16:uniqueId val="{00000002-88E8-F140-81EC-EC36AA0DD4AC}"/>
+              <c16:uniqueId val="{00000002-94D4-DE44-B62E-E0D20670E4A3}"/>
             </c:ext>
           </c:extLst>
         </c:ser>
@@ -16494,7 +16494,38 @@
           <a:bodyPr/>
           <a:lstStyle/>
           <a:p>
+            <a:r>
+              <a:rPr lang="en-US" dirty="0"/>
+              <a:t>Error Bars</a:t>
+            </a:r>
+          </a:p>
+          <a:p>
+            <a:r>
+              <a:rPr lang="en-US" dirty="0" err="1"/>
+              <a:t>Std</a:t>
+            </a:r>
+            <a:r>
+              <a:rPr lang="en-US" dirty="0"/>
+              <a:t> Deviation</a:t>
+            </a:r>
+          </a:p>
+          <a:p>
             <a:endParaRPr lang="en-US" dirty="0"/>
+          </a:p>
+          <a:p>
+            <a:r>
+              <a:rPr lang="en-US" dirty="0"/>
+              <a:t>Global Shuffling?</a:t>
+            </a:r>
+          </a:p>
+          <a:p>
+            <a:endParaRPr lang="en-US" dirty="0"/>
+          </a:p>
+          <a:p>
+            <a:r>
+              <a:rPr lang="en-US" dirty="0"/>
+              <a:t>Initialize a new seed and use that for randomization</a:t>
+            </a:r>
           </a:p>
         </p:txBody>
       </p:sp>
@@ -16562,7 +16593,7 @@
             <a:fld id="{38B511CB-48C6-1D49-AC56-5A39CE8EA9E7}" type="slidenum">
               <a:rPr lang="en-US" smtClean="0"/>
               <a:pPr/>
-              <a:t>34</a:t>
+              <a:t>22</a:t>
             </a:fld>
             <a:endParaRPr lang="en-US"/>
           </a:p>
@@ -16571,7 +16602,7 @@
     </p:spTree>
     <p:extLst>
       <p:ext uri="{BB962C8B-B14F-4D97-AF65-F5344CB8AC3E}">
-        <p14:creationId xmlns:p14="http://schemas.microsoft.com/office/powerpoint/2010/main" val="2962819091"/>
+        <p14:creationId xmlns:p14="http://schemas.microsoft.com/office/powerpoint/2010/main" val="1682672265"/>
       </p:ext>
     </p:extLst>
   </p:cSld>
@@ -16625,7 +16656,517 @@
           <a:bodyPr/>
           <a:lstStyle/>
           <a:p>
+            <a:r>
+              <a:rPr lang="en-US" dirty="0"/>
+              <a:t>The Percentage of IO time in the total training time</a:t>
+            </a:r>
+          </a:p>
+        </p:txBody>
+      </p:sp>
+      <p:sp>
+        <p:nvSpPr>
+          <p:cNvPr id="4" name="Header Placeholder 3"/>
+          <p:cNvSpPr>
+            <a:spLocks noGrp="1"/>
+          </p:cNvSpPr>
+          <p:nvPr>
+            <p:ph type="hdr" sz="quarter" idx="10"/>
+          </p:nvPr>
+        </p:nvSpPr>
+        <p:spPr/>
+        <p:txBody>
+          <a:bodyPr/>
+          <a:lstStyle/>
+          <a:p>
+            <a:r>
+              <a:rPr lang="en-US"/>
+              <a:t>NERSC Presentation</a:t>
+            </a:r>
+          </a:p>
+        </p:txBody>
+      </p:sp>
+      <p:sp>
+        <p:nvSpPr>
+          <p:cNvPr id="5" name="Date Placeholder 4"/>
+          <p:cNvSpPr>
+            <a:spLocks noGrp="1"/>
+          </p:cNvSpPr>
+          <p:nvPr>
+            <p:ph type="dt" idx="11"/>
+          </p:nvPr>
+        </p:nvSpPr>
+        <p:spPr/>
+        <p:txBody>
+          <a:bodyPr/>
+          <a:lstStyle/>
+          <a:p>
+            <a:fld id="{39FEAFF0-7375-1D4A-A389-D6238357B121}" type="datetime1">
+              <a:rPr lang="en-US" smtClean="0"/>
+              <a:pPr/>
+              <a:t>6/29/18</a:t>
+            </a:fld>
+            <a:endParaRPr lang="en-US"/>
+          </a:p>
+        </p:txBody>
+      </p:sp>
+      <p:sp>
+        <p:nvSpPr>
+          <p:cNvPr id="6" name="Slide Number Placeholder 5"/>
+          <p:cNvSpPr>
+            <a:spLocks noGrp="1"/>
+          </p:cNvSpPr>
+          <p:nvPr>
+            <p:ph type="sldNum" sz="quarter" idx="12"/>
+          </p:nvPr>
+        </p:nvSpPr>
+        <p:spPr/>
+        <p:txBody>
+          <a:bodyPr/>
+          <a:lstStyle/>
+          <a:p>
+            <a:fld id="{38B511CB-48C6-1D49-AC56-5A39CE8EA9E7}" type="slidenum">
+              <a:rPr lang="en-US" smtClean="0"/>
+              <a:pPr/>
+              <a:t>26</a:t>
+            </a:fld>
+            <a:endParaRPr lang="en-US"/>
+          </a:p>
+        </p:txBody>
+      </p:sp>
+    </p:spTree>
+    <p:extLst>
+      <p:ext uri="{BB962C8B-B14F-4D97-AF65-F5344CB8AC3E}">
+        <p14:creationId xmlns:p14="http://schemas.microsoft.com/office/powerpoint/2010/main" val="1409871652"/>
+      </p:ext>
+    </p:extLst>
+  </p:cSld>
+  <p:clrMapOvr>
+    <a:masterClrMapping/>
+  </p:clrMapOvr>
+</p:notes>
+</file>
+
+<file path=ppt/notesSlides/notesSlide23.xml><?xml version="1.0" encoding="utf-8"?>
+<p:notes xmlns:a="http://schemas.openxmlformats.org/drawingml/2006/main" xmlns:r="http://schemas.openxmlformats.org/officeDocument/2006/relationships" xmlns:p="http://schemas.openxmlformats.org/presentationml/2006/main">
+  <p:cSld>
+    <p:spTree>
+      <p:nvGrpSpPr>
+        <p:cNvPr id="1" name=""/>
+        <p:cNvGrpSpPr/>
+        <p:nvPr/>
+      </p:nvGrpSpPr>
+      <p:grpSpPr>
+        <a:xfrm>
+          <a:off x="0" y="0"/>
+          <a:ext cx="0" cy="0"/>
+          <a:chOff x="0" y="0"/>
+          <a:chExt cx="0" cy="0"/>
+        </a:xfrm>
+      </p:grpSpPr>
+      <p:sp>
+        <p:nvSpPr>
+          <p:cNvPr id="2" name="Slide Image Placeholder 1"/>
+          <p:cNvSpPr>
+            <a:spLocks noGrp="1" noRot="1" noChangeAspect="1"/>
+          </p:cNvSpPr>
+          <p:nvPr>
+            <p:ph type="sldImg"/>
+          </p:nvPr>
+        </p:nvSpPr>
+        <p:spPr/>
+      </p:sp>
+      <p:sp>
+        <p:nvSpPr>
+          <p:cNvPr id="3" name="Notes Placeholder 2"/>
+          <p:cNvSpPr>
+            <a:spLocks noGrp="1"/>
+          </p:cNvSpPr>
+          <p:nvPr>
+            <p:ph type="body" idx="1"/>
+          </p:nvPr>
+        </p:nvSpPr>
+        <p:spPr/>
+        <p:txBody>
+          <a:bodyPr/>
+          <a:lstStyle/>
+          <a:p>
+            <a:r>
+              <a:rPr lang="en-US" dirty="0"/>
+              <a:t>Scaling plot for IO only with Ideal Scaling</a:t>
+            </a:r>
+          </a:p>
+          <a:p>
+            <a:r>
+              <a:rPr lang="en-US" dirty="0"/>
+              <a:t>Bandwidth from the time and data</a:t>
+            </a:r>
+          </a:p>
+        </p:txBody>
+      </p:sp>
+      <p:sp>
+        <p:nvSpPr>
+          <p:cNvPr id="4" name="Header Placeholder 3"/>
+          <p:cNvSpPr>
+            <a:spLocks noGrp="1"/>
+          </p:cNvSpPr>
+          <p:nvPr>
+            <p:ph type="hdr" sz="quarter" idx="10"/>
+          </p:nvPr>
+        </p:nvSpPr>
+        <p:spPr/>
+        <p:txBody>
+          <a:bodyPr/>
+          <a:lstStyle/>
+          <a:p>
+            <a:r>
+              <a:rPr lang="en-US"/>
+              <a:t>NERSC Presentation</a:t>
+            </a:r>
+          </a:p>
+        </p:txBody>
+      </p:sp>
+      <p:sp>
+        <p:nvSpPr>
+          <p:cNvPr id="5" name="Date Placeholder 4"/>
+          <p:cNvSpPr>
+            <a:spLocks noGrp="1"/>
+          </p:cNvSpPr>
+          <p:nvPr>
+            <p:ph type="dt" idx="11"/>
+          </p:nvPr>
+        </p:nvSpPr>
+        <p:spPr/>
+        <p:txBody>
+          <a:bodyPr/>
+          <a:lstStyle/>
+          <a:p>
+            <a:fld id="{39FEAFF0-7375-1D4A-A389-D6238357B121}" type="datetime1">
+              <a:rPr lang="en-US" smtClean="0"/>
+              <a:pPr/>
+              <a:t>6/29/18</a:t>
+            </a:fld>
+            <a:endParaRPr lang="en-US"/>
+          </a:p>
+        </p:txBody>
+      </p:sp>
+      <p:sp>
+        <p:nvSpPr>
+          <p:cNvPr id="6" name="Slide Number Placeholder 5"/>
+          <p:cNvSpPr>
+            <a:spLocks noGrp="1"/>
+          </p:cNvSpPr>
+          <p:nvPr>
+            <p:ph type="sldNum" sz="quarter" idx="12"/>
+          </p:nvPr>
+        </p:nvSpPr>
+        <p:spPr/>
+        <p:txBody>
+          <a:bodyPr/>
+          <a:lstStyle/>
+          <a:p>
+            <a:fld id="{38B511CB-48C6-1D49-AC56-5A39CE8EA9E7}" type="slidenum">
+              <a:rPr lang="en-US" smtClean="0"/>
+              <a:pPr/>
+              <a:t>32</a:t>
+            </a:fld>
+            <a:endParaRPr lang="en-US"/>
+          </a:p>
+        </p:txBody>
+      </p:sp>
+    </p:spTree>
+    <p:extLst>
+      <p:ext uri="{BB962C8B-B14F-4D97-AF65-F5344CB8AC3E}">
+        <p14:creationId xmlns:p14="http://schemas.microsoft.com/office/powerpoint/2010/main" val="1477149951"/>
+      </p:ext>
+    </p:extLst>
+  </p:cSld>
+  <p:clrMapOvr>
+    <a:masterClrMapping/>
+  </p:clrMapOvr>
+</p:notes>
+</file>
+
+<file path=ppt/notesSlides/notesSlide24.xml><?xml version="1.0" encoding="utf-8"?>
+<p:notes xmlns:a="http://schemas.openxmlformats.org/drawingml/2006/main" xmlns:r="http://schemas.openxmlformats.org/officeDocument/2006/relationships" xmlns:p="http://schemas.openxmlformats.org/presentationml/2006/main">
+  <p:cSld>
+    <p:spTree>
+      <p:nvGrpSpPr>
+        <p:cNvPr id="1" name=""/>
+        <p:cNvGrpSpPr/>
+        <p:nvPr/>
+      </p:nvGrpSpPr>
+      <p:grpSpPr>
+        <a:xfrm>
+          <a:off x="0" y="0"/>
+          <a:ext cx="0" cy="0"/>
+          <a:chOff x="0" y="0"/>
+          <a:chExt cx="0" cy="0"/>
+        </a:xfrm>
+      </p:grpSpPr>
+      <p:sp>
+        <p:nvSpPr>
+          <p:cNvPr id="2" name="Slide Image Placeholder 1"/>
+          <p:cNvSpPr>
+            <a:spLocks noGrp="1" noRot="1" noChangeAspect="1"/>
+          </p:cNvSpPr>
+          <p:nvPr>
+            <p:ph type="sldImg"/>
+          </p:nvPr>
+        </p:nvSpPr>
+        <p:spPr/>
+      </p:sp>
+      <p:sp>
+        <p:nvSpPr>
+          <p:cNvPr id="3" name="Notes Placeholder 2"/>
+          <p:cNvSpPr>
+            <a:spLocks noGrp="1"/>
+          </p:cNvSpPr>
+          <p:nvPr>
+            <p:ph type="body" idx="1"/>
+          </p:nvPr>
+        </p:nvSpPr>
+        <p:spPr/>
+        <p:txBody>
+          <a:bodyPr/>
+          <a:lstStyle/>
+          <a:p>
+            <a:endParaRPr lang="en-US" dirty="0"/>
+          </a:p>
+        </p:txBody>
+      </p:sp>
+      <p:sp>
+        <p:nvSpPr>
+          <p:cNvPr id="4" name="Header Placeholder 3"/>
+          <p:cNvSpPr>
+            <a:spLocks noGrp="1"/>
+          </p:cNvSpPr>
+          <p:nvPr>
+            <p:ph type="hdr" sz="quarter" idx="10"/>
+          </p:nvPr>
+        </p:nvSpPr>
+        <p:spPr/>
+        <p:txBody>
+          <a:bodyPr/>
+          <a:lstStyle/>
+          <a:p>
+            <a:r>
+              <a:rPr lang="en-US"/>
+              <a:t>NERSC Presentation</a:t>
+            </a:r>
+          </a:p>
+        </p:txBody>
+      </p:sp>
+      <p:sp>
+        <p:nvSpPr>
+          <p:cNvPr id="5" name="Date Placeholder 4"/>
+          <p:cNvSpPr>
+            <a:spLocks noGrp="1"/>
+          </p:cNvSpPr>
+          <p:nvPr>
+            <p:ph type="dt" idx="11"/>
+          </p:nvPr>
+        </p:nvSpPr>
+        <p:spPr/>
+        <p:txBody>
+          <a:bodyPr/>
+          <a:lstStyle/>
+          <a:p>
+            <a:fld id="{39FEAFF0-7375-1D4A-A389-D6238357B121}" type="datetime1">
+              <a:rPr lang="en-US" smtClean="0"/>
+              <a:pPr/>
+              <a:t>6/29/18</a:t>
+            </a:fld>
+            <a:endParaRPr lang="en-US"/>
+          </a:p>
+        </p:txBody>
+      </p:sp>
+      <p:sp>
+        <p:nvSpPr>
+          <p:cNvPr id="6" name="Slide Number Placeholder 5"/>
+          <p:cNvSpPr>
+            <a:spLocks noGrp="1"/>
+          </p:cNvSpPr>
+          <p:nvPr>
+            <p:ph type="sldNum" sz="quarter" idx="12"/>
+          </p:nvPr>
+        </p:nvSpPr>
+        <p:spPr/>
+        <p:txBody>
+          <a:bodyPr/>
+          <a:lstStyle/>
+          <a:p>
+            <a:fld id="{38B511CB-48C6-1D49-AC56-5A39CE8EA9E7}" type="slidenum">
+              <a:rPr lang="en-US" smtClean="0"/>
+              <a:pPr/>
+              <a:t>34</a:t>
+            </a:fld>
+            <a:endParaRPr lang="en-US"/>
+          </a:p>
+        </p:txBody>
+      </p:sp>
+    </p:spTree>
+    <p:extLst>
+      <p:ext uri="{BB962C8B-B14F-4D97-AF65-F5344CB8AC3E}">
+        <p14:creationId xmlns:p14="http://schemas.microsoft.com/office/powerpoint/2010/main" val="2962819091"/>
+      </p:ext>
+    </p:extLst>
+  </p:cSld>
+  <p:clrMapOvr>
+    <a:masterClrMapping/>
+  </p:clrMapOvr>
+</p:notes>
+</file>
+
+<file path=ppt/notesSlides/notesSlide25.xml><?xml version="1.0" encoding="utf-8"?>
+<p:notes xmlns:a="http://schemas.openxmlformats.org/drawingml/2006/main" xmlns:r="http://schemas.openxmlformats.org/officeDocument/2006/relationships" xmlns:p="http://schemas.openxmlformats.org/presentationml/2006/main">
+  <p:cSld>
+    <p:spTree>
+      <p:nvGrpSpPr>
+        <p:cNvPr id="1" name=""/>
+        <p:cNvGrpSpPr/>
+        <p:nvPr/>
+      </p:nvGrpSpPr>
+      <p:grpSpPr>
+        <a:xfrm>
+          <a:off x="0" y="0"/>
+          <a:ext cx="0" cy="0"/>
+          <a:chOff x="0" y="0"/>
+          <a:chExt cx="0" cy="0"/>
+        </a:xfrm>
+      </p:grpSpPr>
+      <p:sp>
+        <p:nvSpPr>
+          <p:cNvPr id="2" name="Slide Image Placeholder 1"/>
+          <p:cNvSpPr>
+            <a:spLocks noGrp="1" noRot="1" noChangeAspect="1"/>
+          </p:cNvSpPr>
+          <p:nvPr>
+            <p:ph type="sldImg"/>
+          </p:nvPr>
+        </p:nvSpPr>
+        <p:spPr/>
+      </p:sp>
+      <p:sp>
+        <p:nvSpPr>
+          <p:cNvPr id="3" name="Notes Placeholder 2"/>
+          <p:cNvSpPr>
+            <a:spLocks noGrp="1"/>
+          </p:cNvSpPr>
+          <p:nvPr>
+            <p:ph type="body" idx="1"/>
+          </p:nvPr>
+        </p:nvSpPr>
+        <p:spPr/>
+        <p:txBody>
+          <a:bodyPr/>
+          <a:lstStyle/>
+          <a:p>
+            <a:r>
+              <a:rPr lang="en-US" b="0" dirty="0"/>
+              <a:t>Accumulate in-memory later</a:t>
+            </a:r>
+          </a:p>
+          <a:p>
+            <a:r>
+              <a:rPr lang="en-US" b="0" dirty="0"/>
+              <a:t>Now independent log file</a:t>
+            </a:r>
+          </a:p>
+          <a:p>
             <a:endParaRPr lang="en-US" b="0" dirty="0"/>
+          </a:p>
+          <a:p>
+            <a:r>
+              <a:rPr lang="en-US" b="0" dirty="0"/>
+              <a:t>Take caching out by randomization and then use Burst Buffer</a:t>
+            </a:r>
+          </a:p>
+          <a:p>
+            <a:endParaRPr lang="en-US" b="0" dirty="0"/>
+          </a:p>
+          <a:p>
+            <a:r>
+              <a:rPr lang="en-US" b="0" dirty="0"/>
+              <a:t>TAU event based sampling; call $ </a:t>
+            </a:r>
+            <a:r>
+              <a:rPr lang="en-US" b="0" dirty="0" err="1"/>
+              <a:t>tau_exec</a:t>
+            </a:r>
+            <a:r>
+              <a:rPr lang="en-US" b="0" dirty="0"/>
+              <a:t> – </a:t>
+            </a:r>
+            <a:r>
+              <a:rPr lang="en-US" b="0" dirty="0" err="1"/>
+              <a:t>pds</a:t>
+            </a:r>
+            <a:r>
+              <a:rPr lang="en-US" b="0" dirty="0"/>
+              <a:t>?</a:t>
+            </a:r>
+          </a:p>
+          <a:p>
+            <a:endParaRPr lang="en-US" b="0" dirty="0"/>
+          </a:p>
+          <a:p>
+            <a:r>
+              <a:rPr lang="en-US" b="0" dirty="0"/>
+              <a:t>TAU IO options</a:t>
+            </a:r>
+          </a:p>
+          <a:p>
+            <a:endParaRPr lang="en-US" b="0" dirty="0"/>
+          </a:p>
+          <a:p>
+            <a:r>
+              <a:rPr lang="en-US" b="0" dirty="0"/>
+              <a:t>Use </a:t>
+            </a:r>
+            <a:r>
+              <a:rPr lang="en-US" b="0" dirty="0" err="1"/>
+              <a:t>TensorBoard</a:t>
+            </a:r>
+            <a:r>
+              <a:rPr lang="en-US" b="0" dirty="0"/>
+              <a:t>? – Might get errors.</a:t>
+            </a:r>
+          </a:p>
+          <a:p>
+            <a:endParaRPr lang="en-US" b="0" dirty="0"/>
+          </a:p>
+          <a:p>
+            <a:r>
+              <a:rPr lang="en-US" b="0" dirty="0"/>
+              <a:t>If writing down random self-defined time stamps</a:t>
+            </a:r>
+          </a:p>
+          <a:p>
+            <a:endParaRPr lang="en-US" b="0" dirty="0"/>
+          </a:p>
+          <a:p>
+            <a:r>
+              <a:rPr lang="en-US" b="0" dirty="0" err="1"/>
+              <a:t>Tensorflow</a:t>
+            </a:r>
+            <a:r>
+              <a:rPr lang="en-US" b="0" dirty="0"/>
+              <a:t> Timeline (</a:t>
+            </a:r>
+            <a:r>
+              <a:rPr lang="en-US" b="0" dirty="0" err="1"/>
+              <a:t>json</a:t>
+            </a:r>
+            <a:r>
+              <a:rPr lang="en-US" b="0" dirty="0"/>
+              <a:t> files)</a:t>
+            </a:r>
+          </a:p>
+          <a:p>
+            <a:r>
+              <a:rPr lang="en-US" b="0" dirty="0"/>
+              <a:t>Use Tau-2.27</a:t>
+            </a:r>
           </a:p>
         </p:txBody>
       </p:sp>
@@ -16844,6 +17385,23 @@
             <a:r>
               <a:rPr lang="en-US" b="0" dirty="0"/>
               <a:t>Demo from PyCharm</a:t>
+            </a:r>
+          </a:p>
+          <a:p>
+            <a:endParaRPr lang="en-US" b="0" dirty="0"/>
+          </a:p>
+          <a:p>
+            <a:r>
+              <a:rPr lang="en-US" b="0" dirty="0"/>
+              <a:t>- Recompile </a:t>
+            </a:r>
+            <a:r>
+              <a:rPr lang="en-US" b="0" dirty="0" err="1"/>
+              <a:t>Horovod</a:t>
+            </a:r>
+            <a:r>
+              <a:rPr lang="en-US" b="0" dirty="0"/>
+              <a:t> and link it with IPM</a:t>
             </a:r>
           </a:p>
         </p:txBody>
@@ -23261,7 +23819,7 @@
               <a:rPr lang="en-US" sz="1800" b="0" dirty="0">
                 <a:cs typeface="Avenir Book"/>
               </a:rPr>
-              <a:t> = 64</a:t>
+              <a:t> = 64 and Files are Split Equally</a:t>
             </a:r>
           </a:p>
           <a:p>
@@ -23279,7 +23837,7 @@
               <a:rPr lang="en-US" sz="1800" b="0" dirty="0">
                 <a:cs typeface="Avenir Book"/>
               </a:rPr>
-              <a:t>Each Node Reads 16 Files</a:t>
+              <a:t>Each Node Reads 16 Training Files and 16 Validation Files</a:t>
             </a:r>
           </a:p>
           <a:p>
@@ -23756,7 +24314,7 @@
         </p:xfrm>
         <a:graphic>
           <a:graphicData uri="http://schemas.openxmlformats.org/drawingml/2006/chart">
-            <c:chart xmlns:c="http://schemas.openxmlformats.org/drawingml/2006/chart" xmlns:r="http://schemas.openxmlformats.org/officeDocument/2006/relationships" r:id="rId2"/>
+            <c:chart xmlns:c="http://schemas.openxmlformats.org/drawingml/2006/chart" xmlns:r="http://schemas.openxmlformats.org/officeDocument/2006/relationships" r:id="rId3"/>
           </a:graphicData>
         </a:graphic>
       </p:graphicFrame>
@@ -23984,7 +24542,7 @@
       </p:sp>
       <p:graphicFrame>
         <p:nvGraphicFramePr>
-          <p:cNvPr id="5" name="Chart 4">
+          <p:cNvPr id="6" name="Chart 5">
             <a:extLst>
               <a:ext uri="{FF2B5EF4-FFF2-40B4-BE49-F238E27FC236}">
                 <a16:creationId xmlns:a16="http://schemas.microsoft.com/office/drawing/2014/main" id="{6596FAD5-9A2C-724E-881E-0E112C854451}"/>
@@ -23997,14 +24555,14 @@
           <p:nvPr>
             <p:extLst>
               <p:ext uri="{D42A27DB-BD31-4B8C-83A1-F6EECF244321}">
-                <p14:modId xmlns:p14="http://schemas.microsoft.com/office/powerpoint/2010/main" val="2002610091"/>
+                <p14:modId xmlns:p14="http://schemas.microsoft.com/office/powerpoint/2010/main" val="105336673"/>
               </p:ext>
             </p:extLst>
           </p:nvPr>
         </p:nvGraphicFramePr>
         <p:xfrm>
-          <a:off x="360341" y="839244"/>
-          <a:ext cx="8445455" cy="3782860"/>
+          <a:off x="360343" y="814192"/>
+          <a:ext cx="8457980" cy="3858016"/>
         </p:xfrm>
         <a:graphic>
           <a:graphicData uri="http://schemas.openxmlformats.org/drawingml/2006/chart">
@@ -24260,7 +24818,7 @@
         </p:xfrm>
         <a:graphic>
           <a:graphicData uri="http://schemas.openxmlformats.org/drawingml/2006/chart">
-            <c:chart xmlns:c="http://schemas.openxmlformats.org/drawingml/2006/chart" xmlns:r="http://schemas.openxmlformats.org/officeDocument/2006/relationships" r:id="rId2"/>
+            <c:chart xmlns:c="http://schemas.openxmlformats.org/drawingml/2006/chart" xmlns:r="http://schemas.openxmlformats.org/officeDocument/2006/relationships" r:id="rId3"/>
           </a:graphicData>
         </a:graphic>
       </p:graphicFrame>
@@ -25213,7 +25771,7 @@
         </p:xfrm>
         <a:graphic>
           <a:graphicData uri="http://schemas.openxmlformats.org/drawingml/2006/chart">
-            <c:chart xmlns:c="http://schemas.openxmlformats.org/drawingml/2006/chart" xmlns:r="http://schemas.openxmlformats.org/officeDocument/2006/relationships" r:id="rId2"/>
+            <c:chart xmlns:c="http://schemas.openxmlformats.org/drawingml/2006/chart" xmlns:r="http://schemas.openxmlformats.org/officeDocument/2006/relationships" r:id="rId3"/>
           </a:graphicData>
         </a:graphic>
       </p:graphicFrame>
@@ -26314,13 +26872,13 @@
               <a:buChar char="Ø"/>
             </a:pPr>
             <a:r>
-              <a:rPr lang="en-US" sz="1800" b="0" dirty="0" err="1">
+              <a:rPr lang="en-US" sz="1700" b="0" dirty="0" err="1">
                 <a:cs typeface="Avenir Book"/>
               </a:rPr>
               <a:t>Lustre</a:t>
             </a:r>
             <a:r>
-              <a:rPr lang="en-US" sz="1800" b="0" dirty="0">
+              <a:rPr lang="en-US" sz="1700" b="0" dirty="0">
                 <a:cs typeface="Avenir Book"/>
               </a:rPr>
               <a:t> Directory for Data</a:t>
@@ -26338,55 +26896,55 @@
               <a:buChar char="Ø"/>
             </a:pPr>
             <a:r>
-              <a:rPr lang="en-US" sz="1800" i="1" dirty="0">
+              <a:rPr lang="en-US" sz="1700" i="1" dirty="0">
                 <a:cs typeface="Avenir Book"/>
               </a:rPr>
               <a:t>/global/cscratch1/</a:t>
             </a:r>
             <a:r>
-              <a:rPr lang="en-US" sz="1800" i="1" dirty="0" err="1">
+              <a:rPr lang="en-US" sz="1700" i="1" dirty="0" err="1">
                 <a:cs typeface="Avenir Book"/>
               </a:rPr>
               <a:t>sd</a:t>
             </a:r>
             <a:r>
-              <a:rPr lang="en-US" sz="1800" i="1" dirty="0">
+              <a:rPr lang="en-US" sz="1700" i="1" dirty="0">
                 <a:cs typeface="Avenir Book"/>
               </a:rPr>
               <a:t>/</a:t>
             </a:r>
             <a:r>
-              <a:rPr lang="en-US" sz="1800" i="1" dirty="0" err="1">
+              <a:rPr lang="en-US" sz="1700" i="1" dirty="0" err="1">
                 <a:cs typeface="Avenir Book"/>
               </a:rPr>
               <a:t>ftc</a:t>
             </a:r>
             <a:r>
-              <a:rPr lang="en-US" sz="1800" i="1" dirty="0">
+              <a:rPr lang="en-US" sz="1700" i="1" dirty="0">
                 <a:cs typeface="Avenir Book"/>
               </a:rPr>
               <a:t>/</a:t>
             </a:r>
             <a:r>
-              <a:rPr lang="en-US" sz="1800" i="1" dirty="0" err="1">
+              <a:rPr lang="en-US" sz="1700" i="1" dirty="0" err="1">
                 <a:cs typeface="Avenir Book"/>
               </a:rPr>
               <a:t>deep_learning_data</a:t>
             </a:r>
             <a:r>
-              <a:rPr lang="en-US" sz="1800" i="1" dirty="0">
+              <a:rPr lang="en-US" sz="1700" i="1" dirty="0">
                 <a:cs typeface="Avenir Book"/>
               </a:rPr>
               <a:t>/</a:t>
             </a:r>
             <a:r>
-              <a:rPr lang="en-US" sz="1800" i="1" dirty="0" err="1">
+              <a:rPr lang="en-US" sz="1700" i="1" dirty="0" err="1">
                 <a:cs typeface="Avenir Book"/>
               </a:rPr>
               <a:t>hep_cnn</a:t>
             </a:r>
             <a:r>
-              <a:rPr lang="en-US" sz="1800" i="1" dirty="0">
+              <a:rPr lang="en-US" sz="1700" i="1" dirty="0">
                 <a:cs typeface="Avenir Book"/>
               </a:rPr>
               <a:t>/224x224/</a:t>
@@ -26404,19 +26962,19 @@
               <a:buChar char="Ø"/>
             </a:pPr>
             <a:r>
-              <a:rPr lang="en-US" sz="1800" b="0" dirty="0">
+              <a:rPr lang="en-US" sz="1700" b="0" dirty="0">
                 <a:cs typeface="Avenir Book"/>
               </a:rPr>
               <a:t>1024 Training Files 408 </a:t>
             </a:r>
             <a:r>
-              <a:rPr lang="en-US" sz="1800" b="0" dirty="0" err="1">
+              <a:rPr lang="en-US" sz="1700" b="0" dirty="0" err="1">
                 <a:cs typeface="Avenir Book"/>
               </a:rPr>
               <a:t>MiB</a:t>
             </a:r>
             <a:r>
-              <a:rPr lang="en-US" sz="1800" b="0" dirty="0">
+              <a:rPr lang="en-US" sz="1700" b="0" dirty="0">
                 <a:cs typeface="Avenir Book"/>
               </a:rPr>
               <a:t> each</a:t>
@@ -26434,19 +26992,19 @@
               <a:buChar char="Ø"/>
             </a:pPr>
             <a:r>
-              <a:rPr lang="en-US" sz="1800" b="0" dirty="0">
+              <a:rPr lang="en-US" sz="1700" b="0" dirty="0">
                 <a:cs typeface="Avenir Book"/>
               </a:rPr>
               <a:t>1024 Validation Files 54 </a:t>
             </a:r>
             <a:r>
-              <a:rPr lang="en-US" sz="1800" b="0" dirty="0" err="1">
+              <a:rPr lang="en-US" sz="1700" b="0" dirty="0" err="1">
                 <a:cs typeface="Avenir Book"/>
               </a:rPr>
               <a:t>MiB</a:t>
             </a:r>
             <a:r>
-              <a:rPr lang="en-US" sz="1800" b="0" dirty="0">
+              <a:rPr lang="en-US" sz="1700" b="0" dirty="0">
                 <a:cs typeface="Avenir Book"/>
               </a:rPr>
               <a:t> each</a:t>
@@ -26464,22 +27022,22 @@
               <a:buChar char="Ø"/>
             </a:pPr>
             <a:r>
-              <a:rPr lang="en-US" sz="1800" b="0" dirty="0">
+              <a:rPr lang="en-US" sz="1700" b="0" dirty="0">
                 <a:cs typeface="Avenir Book"/>
               </a:rPr>
               <a:t>Each Node Reads (1024/</a:t>
             </a:r>
             <a:r>
-              <a:rPr lang="en-US" sz="1800" b="0" dirty="0" err="1">
+              <a:rPr lang="en-US" sz="1700" b="0" dirty="0" err="1">
                 <a:cs typeface="Avenir Book"/>
               </a:rPr>
               <a:t>num_of_nodes</a:t>
             </a:r>
             <a:r>
-              <a:rPr lang="en-US" sz="1800" b="0" dirty="0">
+              <a:rPr lang="en-US" sz="1700" b="0" dirty="0">
                 <a:cs typeface="Avenir Book"/>
               </a:rPr>
-              <a:t>) Files</a:t>
+              <a:t>) Training Files and Validation Files if Files are Equally Split</a:t>
             </a:r>
           </a:p>
           <a:p>
@@ -26494,22 +27052,22 @@
               <a:buChar char="Ø"/>
             </a:pPr>
             <a:r>
-              <a:rPr lang="en-US" sz="1800" b="0" dirty="0">
+              <a:rPr lang="en-US" sz="1700" b="0" dirty="0">
                 <a:cs typeface="Avenir Book"/>
               </a:rPr>
               <a:t>If </a:t>
             </a:r>
             <a:r>
-              <a:rPr lang="en-US" sz="1800" b="0" dirty="0" err="1">
+              <a:rPr lang="en-US" sz="1700" b="0" dirty="0" err="1">
                 <a:cs typeface="Avenir Book"/>
               </a:rPr>
               <a:t>num_of_nodes</a:t>
             </a:r>
             <a:r>
-              <a:rPr lang="en-US" sz="1800" b="0" dirty="0">
+              <a:rPr lang="en-US" sz="1700" b="0" dirty="0">
                 <a:cs typeface="Avenir Book"/>
               </a:rPr>
-              <a:t> = 64</a:t>
+              <a:t> = 64 and Files are Equally Split Each Epoch</a:t>
             </a:r>
           </a:p>
           <a:p>
@@ -26524,10 +27082,10 @@
               <a:buChar char="Ø"/>
             </a:pPr>
             <a:r>
-              <a:rPr lang="en-US" sz="1800" b="0" dirty="0">
+              <a:rPr lang="en-US" sz="1700" b="0" dirty="0">
                 <a:cs typeface="Avenir Book"/>
               </a:rPr>
-              <a:t>Each Node Reads 16 Files</a:t>
+              <a:t>Each Node Reads 16 Training Files</a:t>
             </a:r>
           </a:p>
           <a:p>
@@ -26542,31 +27100,31 @@
               <a:buChar char="Ø"/>
             </a:pPr>
             <a:r>
-              <a:rPr lang="en-US" sz="1800" dirty="0">
+              <a:rPr lang="en-US" sz="1700" dirty="0">
                 <a:cs typeface="Avenir Book"/>
               </a:rPr>
               <a:t>Roughly Each Node Reads 16 * 408 </a:t>
             </a:r>
             <a:r>
-              <a:rPr lang="en-US" sz="1800" dirty="0" err="1">
+              <a:rPr lang="en-US" sz="1700" dirty="0" err="1">
                 <a:cs typeface="Avenir Book"/>
               </a:rPr>
               <a:t>MiB</a:t>
             </a:r>
             <a:r>
-              <a:rPr lang="en-US" sz="1800" dirty="0">
+              <a:rPr lang="en-US" sz="1700" dirty="0">
                 <a:cs typeface="Avenir Book"/>
               </a:rPr>
               <a:t> = 6.375 </a:t>
             </a:r>
             <a:r>
-              <a:rPr lang="en-US" sz="1800" dirty="0" err="1">
+              <a:rPr lang="en-US" sz="1700" dirty="0" err="1">
                 <a:cs typeface="Avenir Book"/>
               </a:rPr>
               <a:t>GiB</a:t>
             </a:r>
             <a:r>
-              <a:rPr lang="en-US" sz="1800" dirty="0">
+              <a:rPr lang="en-US" sz="1700" dirty="0">
                 <a:cs typeface="Avenir Book"/>
               </a:rPr>
               <a:t> of Training Data</a:t>
@@ -26584,55 +27142,55 @@
               <a:buChar char="Ø"/>
             </a:pPr>
             <a:r>
-              <a:rPr lang="en-US" sz="1800" dirty="0">
+              <a:rPr lang="en-US" sz="1700" dirty="0">
                 <a:cs typeface="Avenir Book"/>
               </a:rPr>
               <a:t>And </a:t>
             </a:r>
             <a:r>
-              <a:rPr lang="en-US" sz="1800" b="0" dirty="0">
+              <a:rPr lang="en-US" sz="1700" b="0" dirty="0">
                 <a:cs typeface="Avenir Book"/>
               </a:rPr>
               <a:t>Each Node Reads 16 * 54 </a:t>
             </a:r>
             <a:r>
-              <a:rPr lang="en-US" sz="1800" b="0" dirty="0" err="1">
+              <a:rPr lang="en-US" sz="1700" b="0" dirty="0" err="1">
                 <a:cs typeface="Avenir Book"/>
               </a:rPr>
               <a:t>MiB</a:t>
             </a:r>
             <a:r>
-              <a:rPr lang="en-US" sz="1800" b="0" dirty="0">
+              <a:rPr lang="en-US" sz="1700" b="0" dirty="0">
                 <a:cs typeface="Avenir Book"/>
               </a:rPr>
               <a:t> = </a:t>
             </a:r>
             <a:r>
-              <a:rPr lang="en-US" sz="1800" dirty="0">
+              <a:rPr lang="en-US" sz="1700" dirty="0">
                 <a:cs typeface="Avenir Book"/>
               </a:rPr>
               <a:t>0.84375 </a:t>
             </a:r>
             <a:r>
-              <a:rPr lang="en-US" sz="1800" dirty="0" err="1">
+              <a:rPr lang="en-US" sz="1700" dirty="0" err="1">
                 <a:cs typeface="Avenir Book"/>
               </a:rPr>
               <a:t>GiB</a:t>
             </a:r>
             <a:r>
-              <a:rPr lang="en-US" sz="1800" dirty="0">
+              <a:rPr lang="en-US" sz="1700" dirty="0">
                 <a:cs typeface="Avenir Book"/>
               </a:rPr>
               <a:t> or 864 </a:t>
             </a:r>
             <a:r>
-              <a:rPr lang="en-US" sz="1800" dirty="0" err="1">
+              <a:rPr lang="en-US" sz="1700" dirty="0" err="1">
                 <a:cs typeface="Avenir Book"/>
               </a:rPr>
               <a:t>MiB</a:t>
             </a:r>
             <a:r>
-              <a:rPr lang="en-US" sz="1800" dirty="0">
+              <a:rPr lang="en-US" sz="1700" dirty="0">
                 <a:cs typeface="Avenir Book"/>
               </a:rPr>
               <a:t> of Validation Data</a:t>

</xml_diff>

<commit_message>
Add provision to optionally disable training in climate data project for test purpose only
</commit_message>
<xml_diff>
--- a/related_works/summary_slides/Project_Progress_Time_Breakdown_IO_20180629.pptx
+++ b/related_works/summary_slides/Project_Progress_Time_Breakdown_IO_20180629.pptx
@@ -17349,7 +17349,7 @@
             <a:fld id="{EA3D68A3-9B80-584C-9BEB-F8B43CF5A651}" type="datetime1">
               <a:rPr lang="en-US" sz="900" smtClean="0"/>
               <a:pPr/>
-              <a:t>7/2/18</a:t>
+              <a:t>7/3/18</a:t>
             </a:fld>
             <a:endParaRPr lang="en-US" sz="900"/>
           </a:p>
@@ -17520,7 +17520,7 @@
             <a:fld id="{39FEAFF0-7375-1D4A-A389-D6238357B121}" type="datetime1">
               <a:rPr lang="en-US" smtClean="0"/>
               <a:pPr/>
-              <a:t>7/2/18</a:t>
+              <a:t>7/3/18</a:t>
             </a:fld>
             <a:endParaRPr lang="en-US"/>
           </a:p>
@@ -17879,7 +17879,7 @@
             <a:fld id="{39FEAFF0-7375-1D4A-A389-D6238357B121}" type="datetime1">
               <a:rPr lang="en-US" smtClean="0"/>
               <a:pPr/>
-              <a:t>7/2/18</a:t>
+              <a:t>7/3/18</a:t>
             </a:fld>
             <a:endParaRPr lang="en-US"/>
           </a:p>
@@ -18890,7 +18890,7 @@
             <a:fld id="{39FEAFF0-7375-1D4A-A389-D6238357B121}" type="datetime1">
               <a:rPr lang="en-US" smtClean="0"/>
               <a:pPr/>
-              <a:t>7/2/18</a:t>
+              <a:t>7/3/18</a:t>
             </a:fld>
             <a:endParaRPr lang="en-US"/>
           </a:p>
@@ -19021,7 +19021,7 @@
             <a:fld id="{39FEAFF0-7375-1D4A-A389-D6238357B121}" type="datetime1">
               <a:rPr lang="en-US" smtClean="0"/>
               <a:pPr/>
-              <a:t>7/2/18</a:t>
+              <a:t>7/3/18</a:t>
             </a:fld>
             <a:endParaRPr lang="en-US"/>
           </a:p>
@@ -19183,7 +19183,7 @@
             <a:fld id="{39FEAFF0-7375-1D4A-A389-D6238357B121}" type="datetime1">
               <a:rPr lang="en-US" smtClean="0"/>
               <a:pPr/>
-              <a:t>7/2/18</a:t>
+              <a:t>7/3/18</a:t>
             </a:fld>
             <a:endParaRPr lang="en-US"/>
           </a:p>
@@ -19317,7 +19317,7 @@
             <a:fld id="{39FEAFF0-7375-1D4A-A389-D6238357B121}" type="datetime1">
               <a:rPr lang="en-US" smtClean="0"/>
               <a:pPr/>
-              <a:t>7/2/18</a:t>
+              <a:t>7/3/18</a:t>
             </a:fld>
             <a:endParaRPr lang="en-US"/>
           </a:p>
@@ -19457,7 +19457,7 @@
             <a:fld id="{39FEAFF0-7375-1D4A-A389-D6238357B121}" type="datetime1">
               <a:rPr lang="en-US" smtClean="0"/>
               <a:pPr/>
-              <a:t>7/2/18</a:t>
+              <a:t>7/3/18</a:t>
             </a:fld>
             <a:endParaRPr lang="en-US"/>
           </a:p>
@@ -19597,7 +19597,7 @@
             <a:fld id="{39FEAFF0-7375-1D4A-A389-D6238357B121}" type="datetime1">
               <a:rPr lang="en-US" smtClean="0"/>
               <a:pPr/>
-              <a:t>7/2/18</a:t>
+              <a:t>7/3/18</a:t>
             </a:fld>
             <a:endParaRPr lang="en-US"/>
           </a:p>
@@ -19737,7 +19737,7 @@
             <a:fld id="{39FEAFF0-7375-1D4A-A389-D6238357B121}" type="datetime1">
               <a:rPr lang="en-US" smtClean="0"/>
               <a:pPr/>
-              <a:t>7/2/18</a:t>
+              <a:t>7/3/18</a:t>
             </a:fld>
             <a:endParaRPr lang="en-US"/>
           </a:p>
@@ -19868,7 +19868,7 @@
             <a:fld id="{39FEAFF0-7375-1D4A-A389-D6238357B121}" type="datetime1">
               <a:rPr lang="en-US" smtClean="0"/>
               <a:pPr/>
-              <a:t>7/2/18</a:t>
+              <a:t>7/3/18</a:t>
             </a:fld>
             <a:endParaRPr lang="en-US"/>
           </a:p>
@@ -20189,7 +20189,7 @@
             <a:fld id="{39FEAFF0-7375-1D4A-A389-D6238357B121}" type="datetime1">
               <a:rPr lang="en-US" smtClean="0"/>
               <a:pPr/>
-              <a:t>7/2/18</a:t>
+              <a:t>7/3/18</a:t>
             </a:fld>
             <a:endParaRPr lang="en-US"/>
           </a:p>
@@ -20425,7 +20425,7 @@
             <a:fld id="{39FEAFF0-7375-1D4A-A389-D6238357B121}" type="datetime1">
               <a:rPr lang="en-US" smtClean="0"/>
               <a:pPr/>
-              <a:t>7/2/18</a:t>
+              <a:t>7/3/18</a:t>
             </a:fld>
             <a:endParaRPr lang="en-US"/>
           </a:p>
@@ -21099,7 +21099,7 @@
             <a:fld id="{D897A66F-DFB6-CB44-8B31-7FAB7C20B0C7}" type="datetime4">
               <a:rPr lang="en-US" smtClean="0"/>
               <a:pPr/>
-              <a:t>July 2, 2018</a:t>
+              <a:t>July 3, 2018</a:t>
             </a:fld>
             <a:endParaRPr lang="en-US" dirty="0"/>
           </a:p>

</xml_diff>

<commit_message>
Add plotting scripts; Add presentation slides; Remove redundant IO call in tiramisu_helpers
</commit_message>
<xml_diff>
--- a/related_works/summary_slides/Project_Progress_Time_Breakdown_IO_20180629.pptx
+++ b/related_works/summary_slides/Project_Progress_Time_Breakdown_IO_20180629.pptx
@@ -17349,7 +17349,7 @@
             <a:fld id="{EA3D68A3-9B80-584C-9BEB-F8B43CF5A651}" type="datetime1">
               <a:rPr lang="en-US" sz="900" smtClean="0"/>
               <a:pPr/>
-              <a:t>7/3/18</a:t>
+              <a:t>7/12/18</a:t>
             </a:fld>
             <a:endParaRPr lang="en-US" sz="900"/>
           </a:p>
@@ -17520,7 +17520,7 @@
             <a:fld id="{39FEAFF0-7375-1D4A-A389-D6238357B121}" type="datetime1">
               <a:rPr lang="en-US" smtClean="0"/>
               <a:pPr/>
-              <a:t>7/3/18</a:t>
+              <a:t>7/12/18</a:t>
             </a:fld>
             <a:endParaRPr lang="en-US"/>
           </a:p>
@@ -17879,7 +17879,7 @@
             <a:fld id="{39FEAFF0-7375-1D4A-A389-D6238357B121}" type="datetime1">
               <a:rPr lang="en-US" smtClean="0"/>
               <a:pPr/>
-              <a:t>7/3/18</a:t>
+              <a:t>7/12/18</a:t>
             </a:fld>
             <a:endParaRPr lang="en-US"/>
           </a:p>
@@ -18890,7 +18890,7 @@
             <a:fld id="{39FEAFF0-7375-1D4A-A389-D6238357B121}" type="datetime1">
               <a:rPr lang="en-US" smtClean="0"/>
               <a:pPr/>
-              <a:t>7/3/18</a:t>
+              <a:t>7/12/18</a:t>
             </a:fld>
             <a:endParaRPr lang="en-US"/>
           </a:p>
@@ -19021,7 +19021,7 @@
             <a:fld id="{39FEAFF0-7375-1D4A-A389-D6238357B121}" type="datetime1">
               <a:rPr lang="en-US" smtClean="0"/>
               <a:pPr/>
-              <a:t>7/3/18</a:t>
+              <a:t>7/12/18</a:t>
             </a:fld>
             <a:endParaRPr lang="en-US"/>
           </a:p>
@@ -19183,7 +19183,7 @@
             <a:fld id="{39FEAFF0-7375-1D4A-A389-D6238357B121}" type="datetime1">
               <a:rPr lang="en-US" smtClean="0"/>
               <a:pPr/>
-              <a:t>7/3/18</a:t>
+              <a:t>7/12/18</a:t>
             </a:fld>
             <a:endParaRPr lang="en-US"/>
           </a:p>
@@ -19317,7 +19317,7 @@
             <a:fld id="{39FEAFF0-7375-1D4A-A389-D6238357B121}" type="datetime1">
               <a:rPr lang="en-US" smtClean="0"/>
               <a:pPr/>
-              <a:t>7/3/18</a:t>
+              <a:t>7/12/18</a:t>
             </a:fld>
             <a:endParaRPr lang="en-US"/>
           </a:p>
@@ -19457,7 +19457,7 @@
             <a:fld id="{39FEAFF0-7375-1D4A-A389-D6238357B121}" type="datetime1">
               <a:rPr lang="en-US" smtClean="0"/>
               <a:pPr/>
-              <a:t>7/3/18</a:t>
+              <a:t>7/12/18</a:t>
             </a:fld>
             <a:endParaRPr lang="en-US"/>
           </a:p>
@@ -19597,7 +19597,7 @@
             <a:fld id="{39FEAFF0-7375-1D4A-A389-D6238357B121}" type="datetime1">
               <a:rPr lang="en-US" smtClean="0"/>
               <a:pPr/>
-              <a:t>7/3/18</a:t>
+              <a:t>7/12/18</a:t>
             </a:fld>
             <a:endParaRPr lang="en-US"/>
           </a:p>
@@ -19737,7 +19737,7 @@
             <a:fld id="{39FEAFF0-7375-1D4A-A389-D6238357B121}" type="datetime1">
               <a:rPr lang="en-US" smtClean="0"/>
               <a:pPr/>
-              <a:t>7/3/18</a:t>
+              <a:t>7/12/18</a:t>
             </a:fld>
             <a:endParaRPr lang="en-US"/>
           </a:p>
@@ -19868,7 +19868,7 @@
             <a:fld id="{39FEAFF0-7375-1D4A-A389-D6238357B121}" type="datetime1">
               <a:rPr lang="en-US" smtClean="0"/>
               <a:pPr/>
-              <a:t>7/3/18</a:t>
+              <a:t>7/12/18</a:t>
             </a:fld>
             <a:endParaRPr lang="en-US"/>
           </a:p>
@@ -20189,7 +20189,7 @@
             <a:fld id="{39FEAFF0-7375-1D4A-A389-D6238357B121}" type="datetime1">
               <a:rPr lang="en-US" smtClean="0"/>
               <a:pPr/>
-              <a:t>7/3/18</a:t>
+              <a:t>7/12/18</a:t>
             </a:fld>
             <a:endParaRPr lang="en-US"/>
           </a:p>
@@ -20425,7 +20425,7 @@
             <a:fld id="{39FEAFF0-7375-1D4A-A389-D6238357B121}" type="datetime1">
               <a:rPr lang="en-US" smtClean="0"/>
               <a:pPr/>
-              <a:t>7/3/18</a:t>
+              <a:t>7/12/18</a:t>
             </a:fld>
             <a:endParaRPr lang="en-US"/>
           </a:p>
@@ -21099,7 +21099,7 @@
             <a:fld id="{D897A66F-DFB6-CB44-8B31-7FAB7C20B0C7}" type="datetime4">
               <a:rPr lang="en-US" smtClean="0"/>
               <a:pPr/>
-              <a:t>July 3, 2018</a:t>
+              <a:t>July 12, 2018</a:t>
             </a:fld>
             <a:endParaRPr lang="en-US" dirty="0"/>
           </a:p>
@@ -28974,7 +28974,15 @@
           <a:p>
             <a:r>
               <a:rPr lang="en-US" dirty="0"/>
-              <a:t>Total Time Scale Out</a:t>
+              <a:t>Total </a:t>
+            </a:r>
+            <a:r>
+              <a:rPr lang="en-US"/>
+              <a:t>Read Count </a:t>
+            </a:r>
+            <a:r>
+              <a:rPr lang="en-US" dirty="0"/>
+              <a:t>Scale Out</a:t>
             </a:r>
           </a:p>
         </p:txBody>

</xml_diff>